<commit_message>
PPT last update (Maybe)
</commit_message>
<xml_diff>
--- a/report/Database Present.pptx
+++ b/report/Database Present.pptx
@@ -5875,14 +5875,64 @@
             <p:ph type="ctrTitle"/>
           </p:nvPr>
         </p:nvSpPr>
-        <p:spPr/>
+        <p:spPr>
+          <a:xfrm>
+            <a:off x="639192" y="1490133"/>
+            <a:ext cx="9339309" cy="3268297"/>
+          </a:xfrm>
+        </p:spPr>
         <p:txBody>
           <a:bodyPr/>
           <a:lstStyle/>
           <a:p>
+            <a:pPr algn="ctr"/>
             <a:r>
               <a:rPr lang="en-US" dirty="0"/>
-              <a:t>Database Present </a:t>
+              <a:t>Present</a:t>
+            </a:r>
+            <a:r>
+              <a:rPr lang="th-TH" dirty="0"/>
+              <a:t> </a:t>
+            </a:r>
+            <a:r>
+              <a:rPr lang="en-US" dirty="0"/>
+              <a:t>Database</a:t>
+            </a:r>
+            <a:br>
+              <a:rPr lang="th-TH" dirty="0"/>
+            </a:br>
+            <a:br>
+              <a:rPr lang="en-US" sz="4400" dirty="0"/>
+            </a:br>
+            <a:r>
+              <a:rPr lang="th-TH" sz="4400" b="1" dirty="0">
+                <a:effectLst/>
+                <a:latin typeface="BrowalliaUPC" panose="020B0604020202020204" pitchFamily="34" charset="-34"/>
+                <a:ea typeface="BrowalliaUPC" panose="020B0604020202020204" pitchFamily="34" charset="-34"/>
+                <a:cs typeface="BrowalliaUPC" panose="020B0604020202020204" pitchFamily="34" charset="-34"/>
+              </a:rPr>
+              <a:t>ระบบฐานข้อมูลบันทึกความดีออนไลน์</a:t>
+            </a:r>
+            <a:r>
+              <a:rPr lang="en-US" sz="4400" b="1" dirty="0">
+                <a:effectLst/>
+                <a:latin typeface="BrowalliaUPC" panose="020B0604020202020204" pitchFamily="34" charset="-34"/>
+                <a:ea typeface="BrowalliaUPC" panose="020B0604020202020204" pitchFamily="34" charset="-34"/>
+                <a:cs typeface="BrowalliaUPC" panose="020B0604020202020204" pitchFamily="34" charset="-34"/>
+              </a:rPr>
+              <a:t> (Grace notes)</a:t>
+            </a:r>
+            <a:br>
+              <a:rPr lang="en-US" sz="1800" dirty="0">
+                <a:effectLst/>
+                <a:latin typeface="BrowalliaUPC" panose="020B0604020202020204" pitchFamily="34" charset="-34"/>
+                <a:ea typeface="BrowalliaUPC" panose="020B0604020202020204" pitchFamily="34" charset="-34"/>
+                <a:cs typeface="BrowalliaUPC" panose="020B0604020202020204" pitchFamily="34" charset="-34"/>
+              </a:rPr>
+            </a:br>
+            <a:r>
+              <a:rPr lang="en-US" dirty="0"/>
+              <a:t> </a:t>
             </a:r>
             <a:endParaRPr lang="th-TH" dirty="0"/>
           </a:p>

</xml_diff>